<commit_message>
Update slides once again
</commit_message>
<xml_diff>
--- a/slides.pptx
+++ b/slides.pptx
@@ -7705,7 +7705,7 @@
                           <a:rPr lang="fr-BE" altLang="fr-FR" sz="2800" b="0" i="1" smtClean="0">
                             <a:latin typeface="Cambria Math" panose="02040503050406030204" pitchFamily="18" charset="0"/>
                           </a:rPr>
-                          <m:t>𝑆𝑡𝑎𝑡𝑒</m:t>
+                          <m:t>𝐸𝑡𝑎𝑡</m:t>
                         </m:r>
                         <m:r>
                           <a:rPr lang="fr-BE" altLang="fr-FR" sz="2800" b="0" i="1" smtClean="0">
@@ -7795,7 +7795,7 @@
                     <a:latin typeface="Cambria Math" panose="02040503050406030204" pitchFamily="18" charset="0"/>
                     <a:ea typeface="Cambria Math" panose="02040503050406030204" pitchFamily="18" charset="0"/>
                   </a:rPr>
-                  <a:t>t.State</a:t>
+                  <a:t>t.Etat</a:t>
                 </a:r>
                 <a:r>
                   <a:rPr lang="fr-BE" altLang="fr-FR" sz="2800" dirty="0">
@@ -7868,7 +7868,7 @@
                     <a:latin typeface="Cambria Math" panose="02040503050406030204" pitchFamily="18" charset="0"/>
                     <a:ea typeface="Cambria Math" panose="02040503050406030204" pitchFamily="18" charset="0"/>
                   </a:rPr>
-                  <a:t>WHERE State = ‘libre’</a:t>
+                  <a:t>WHERE Etat = ‘libre’</a:t>
                 </a:r>
                 <a:endParaRPr lang="fr-BE" altLang="fr-FR" sz="2800" dirty="0"/>
               </a:p>
@@ -8180,8 +8180,8 @@
           </a:p>
         </p:txBody>
       </p:sp>
-      <mc:AlternateContent xmlns:mc="http://schemas.openxmlformats.org/markup-compatibility/2006">
-        <mc:Choice xmlns:a14="http://schemas.microsoft.com/office/drawing/2010/main" Requires="a14">
+      <mc:AlternateContent xmlns:mc="http://schemas.openxmlformats.org/markup-compatibility/2006" xmlns:a14="http://schemas.microsoft.com/office/drawing/2010/main">
+        <mc:Choice Requires="a14">
           <p:sp>
             <p:nvSpPr>
               <p:cNvPr id="10243" name="Espace réservé du contenu 2">
@@ -8243,6 +8243,7 @@
                       <m:sSubPr>
                         <m:ctrlPr>
                           <a:rPr lang="fr-BE" altLang="fr-FR" sz="2800" i="1" smtClean="0">
+                            <a:latin typeface="Cambria Math" panose="02040503050406030204" pitchFamily="18" charset="0"/>
                             <a:ea typeface="Cambria Math" panose="02040503050406030204" pitchFamily="18" charset="0"/>
                           </a:rPr>
                         </m:ctrlPr>
@@ -8250,6 +8251,7 @@
                       <m:e>
                         <m:r>
                           <a:rPr lang="fr-BE" altLang="fr-FR" sz="2800" i="1" smtClean="0">
+                            <a:latin typeface="Cambria Math" panose="02040503050406030204" pitchFamily="18" charset="0"/>
                             <a:ea typeface="Cambria Math" panose="02040503050406030204" pitchFamily="18" charset="0"/>
                           </a:rPr>
                           <m:t>𝜋</m:t>
@@ -8258,12 +8260,14 @@
                       <m:sub>
                         <m:r>
                           <a:rPr lang="fr-BE" altLang="fr-FR" sz="2800" b="0" i="1" smtClean="0">
+                            <a:latin typeface="Cambria Math" panose="02040503050406030204" pitchFamily="18" charset="0"/>
                             <a:ea typeface="Cambria Math" panose="02040503050406030204" pitchFamily="18" charset="0"/>
                           </a:rPr>
                           <m:t>𝑅</m:t>
                         </m:r>
                         <m:r>
                           <a:rPr lang="fr-BE" altLang="fr-FR" sz="2800" b="0" i="1" smtClean="0">
+                            <a:latin typeface="Cambria Math" panose="02040503050406030204" pitchFamily="18" charset="0"/>
                             <a:ea typeface="Cambria Math" panose="02040503050406030204" pitchFamily="18" charset="0"/>
                           </a:rPr>
                           <m:t>.∗</m:t>
@@ -8274,6 +8278,7 @@
                       <m:dPr>
                         <m:ctrlPr>
                           <a:rPr lang="fr-BE" altLang="fr-FR" sz="2800" b="0" i="1" smtClean="0">
+                            <a:latin typeface="Cambria Math" panose="02040503050406030204" pitchFamily="18" charset="0"/>
                             <a:ea typeface="Cambria Math" panose="02040503050406030204" pitchFamily="18" charset="0"/>
                           </a:rPr>
                         </m:ctrlPr>
@@ -8281,12 +8286,14 @@
                       <m:e>
                         <m:r>
                           <a:rPr lang="fr-BE" altLang="fr-FR" sz="2800" b="0" i="1" smtClean="0">
+                            <a:latin typeface="Cambria Math" panose="02040503050406030204" pitchFamily="18" charset="0"/>
                             <a:ea typeface="Cambria Math" panose="02040503050406030204" pitchFamily="18" charset="0"/>
                           </a:rPr>
                           <m:t>𝑇</m:t>
                         </m:r>
                         <m:r>
                           <a:rPr lang="fr-BE" altLang="fr-FR" sz="2800" b="0" i="1" smtClean="0">
+                            <a:latin typeface="Cambria Math" panose="02040503050406030204" pitchFamily="18" charset="0"/>
                             <a:ea typeface="Cambria Math" panose="02040503050406030204" pitchFamily="18" charset="0"/>
                           </a:rPr>
                           <m:t> </m:t>
@@ -8295,6 +8302,7 @@
                           <m:sSubPr>
                             <m:ctrlPr>
                               <a:rPr lang="fr-BE" altLang="fr-FR" sz="2800" b="0" i="1" smtClean="0">
+                                <a:latin typeface="Cambria Math" panose="02040503050406030204" pitchFamily="18" charset="0"/>
                                 <a:ea typeface="Cambria Math" panose="02040503050406030204" pitchFamily="18" charset="0"/>
                               </a:rPr>
                             </m:ctrlPr>
@@ -8302,6 +8310,7 @@
                           <m:e>
                             <m:r>
                               <a:rPr lang="fr-BE" altLang="fr-FR" sz="2800" b="0" i="1" smtClean="0">
+                                <a:latin typeface="Cambria Math" panose="02040503050406030204" pitchFamily="18" charset="0"/>
                                 <a:ea typeface="Cambria Math" panose="02040503050406030204" pitchFamily="18" charset="0"/>
                               </a:rPr>
                               <m:t>⋈</m:t>
@@ -8310,90 +8319,105 @@
                           <m:sub>
                             <m:r>
                               <a:rPr lang="fr-BE" altLang="fr-FR" sz="2800" b="0" i="1" smtClean="0">
+                                <a:latin typeface="Cambria Math" panose="02040503050406030204" pitchFamily="18" charset="0"/>
                                 <a:ea typeface="Cambria Math" panose="02040503050406030204" pitchFamily="18" charset="0"/>
                               </a:rPr>
                               <m:t>𝑇</m:t>
                             </m:r>
                             <m:r>
                               <a:rPr lang="fr-BE" altLang="fr-FR" sz="2800" b="0" i="1" smtClean="0">
+                                <a:latin typeface="Cambria Math" panose="02040503050406030204" pitchFamily="18" charset="0"/>
                                 <a:ea typeface="Cambria Math" panose="02040503050406030204" pitchFamily="18" charset="0"/>
                               </a:rPr>
                               <m:t>.</m:t>
                             </m:r>
                             <m:r>
                               <a:rPr lang="fr-BE" altLang="fr-FR" sz="2800" b="0" i="1" smtClean="0">
+                                <a:latin typeface="Cambria Math" panose="02040503050406030204" pitchFamily="18" charset="0"/>
                                 <a:ea typeface="Cambria Math" panose="02040503050406030204" pitchFamily="18" charset="0"/>
                               </a:rPr>
                               <m:t>𝑈𝐼𝐷</m:t>
                             </m:r>
                             <m:r>
                               <a:rPr lang="fr-BE" altLang="fr-FR" sz="2800" b="0" i="1" smtClean="0">
+                                <a:latin typeface="Cambria Math" panose="02040503050406030204" pitchFamily="18" charset="0"/>
                                 <a:ea typeface="Cambria Math" panose="02040503050406030204" pitchFamily="18" charset="0"/>
                               </a:rPr>
                               <m:t>=</m:t>
                             </m:r>
                             <m:r>
                               <a:rPr lang="fr-BE" altLang="fr-FR" sz="2800" b="0" i="1" smtClean="0">
+                                <a:latin typeface="Cambria Math" panose="02040503050406030204" pitchFamily="18" charset="0"/>
                                 <a:ea typeface="Cambria Math" panose="02040503050406030204" pitchFamily="18" charset="0"/>
                               </a:rPr>
                               <m:t>𝑅</m:t>
                             </m:r>
                             <m:r>
                               <a:rPr lang="fr-BE" altLang="fr-FR" sz="2800" b="0" i="1" smtClean="0">
+                                <a:latin typeface="Cambria Math" panose="02040503050406030204" pitchFamily="18" charset="0"/>
                                 <a:ea typeface="Cambria Math" panose="02040503050406030204" pitchFamily="18" charset="0"/>
                               </a:rPr>
                               <m:t>.</m:t>
                             </m:r>
                             <m:r>
                               <a:rPr lang="fr-BE" altLang="fr-FR" sz="2800" b="0" i="1" smtClean="0">
+                                <a:latin typeface="Cambria Math" panose="02040503050406030204" pitchFamily="18" charset="0"/>
                                 <a:ea typeface="Cambria Math" panose="02040503050406030204" pitchFamily="18" charset="0"/>
                               </a:rPr>
                               <m:t>𝑈𝐼𝐷</m:t>
                             </m:r>
                             <m:r>
                               <a:rPr lang="fr-BE" altLang="fr-FR" sz="2800" b="0" i="1" smtClean="0">
+                                <a:latin typeface="Cambria Math" panose="02040503050406030204" pitchFamily="18" charset="0"/>
                                 <a:ea typeface="Cambria Math" panose="02040503050406030204" pitchFamily="18" charset="0"/>
                               </a:rPr>
                               <m:t>,</m:t>
                             </m:r>
                             <m:r>
                               <a:rPr lang="fr-BE" altLang="fr-FR" sz="2800" b="0" i="1" smtClean="0">
+                                <a:latin typeface="Cambria Math" panose="02040503050406030204" pitchFamily="18" charset="0"/>
                                 <a:ea typeface="Cambria Math" panose="02040503050406030204" pitchFamily="18" charset="0"/>
                               </a:rPr>
                               <m:t>𝑇</m:t>
                             </m:r>
                             <m:r>
                               <a:rPr lang="fr-BE" altLang="fr-FR" sz="2800" b="0" i="1" smtClean="0">
+                                <a:latin typeface="Cambria Math" panose="02040503050406030204" pitchFamily="18" charset="0"/>
                                 <a:ea typeface="Cambria Math" panose="02040503050406030204" pitchFamily="18" charset="0"/>
                               </a:rPr>
                               <m:t>.</m:t>
                             </m:r>
                             <m:r>
                               <a:rPr lang="fr-BE" altLang="fr-FR" sz="2800" b="0" i="1" smtClean="0">
+                                <a:latin typeface="Cambria Math" panose="02040503050406030204" pitchFamily="18" charset="0"/>
                                 <a:ea typeface="Cambria Math" panose="02040503050406030204" pitchFamily="18" charset="0"/>
                               </a:rPr>
                               <m:t>𝑇𝐼𝐷</m:t>
                             </m:r>
                             <m:r>
                               <a:rPr lang="fr-BE" altLang="fr-FR" sz="2800" b="0" i="1" smtClean="0">
+                                <a:latin typeface="Cambria Math" panose="02040503050406030204" pitchFamily="18" charset="0"/>
                                 <a:ea typeface="Cambria Math" panose="02040503050406030204" pitchFamily="18" charset="0"/>
                               </a:rPr>
                               <m:t>=</m:t>
                             </m:r>
                             <m:r>
                               <a:rPr lang="fr-BE" altLang="fr-FR" sz="2800" b="0" i="1" smtClean="0">
+                                <a:latin typeface="Cambria Math" panose="02040503050406030204" pitchFamily="18" charset="0"/>
                                 <a:ea typeface="Cambria Math" panose="02040503050406030204" pitchFamily="18" charset="0"/>
                               </a:rPr>
                               <m:t>𝑅</m:t>
                             </m:r>
                             <m:r>
                               <a:rPr lang="fr-BE" altLang="fr-FR" sz="2800" b="0" i="1" smtClean="0">
+                                <a:latin typeface="Cambria Math" panose="02040503050406030204" pitchFamily="18" charset="0"/>
                                 <a:ea typeface="Cambria Math" panose="02040503050406030204" pitchFamily="18" charset="0"/>
                               </a:rPr>
                               <m:t>.</m:t>
                             </m:r>
                             <m:r>
                               <a:rPr lang="fr-BE" altLang="fr-FR" sz="2800" b="0" i="1" smtClean="0">
+                                <a:latin typeface="Cambria Math" panose="02040503050406030204" pitchFamily="18" charset="0"/>
                                 <a:ea typeface="Cambria Math" panose="02040503050406030204" pitchFamily="18" charset="0"/>
                               </a:rPr>
                               <m:t>𝑇𝐼𝐷</m:t>
@@ -8402,6 +8426,7 @@
                         </m:sSub>
                         <m:r>
                           <a:rPr lang="fr-BE" altLang="fr-FR" sz="2800" b="0" i="1" smtClean="0">
+                            <a:latin typeface="Cambria Math" panose="02040503050406030204" pitchFamily="18" charset="0"/>
                             <a:ea typeface="Cambria Math" panose="02040503050406030204" pitchFamily="18" charset="0"/>
                           </a:rPr>
                           <m:t>𝑅</m:t>
@@ -8427,12 +8452,15 @@
                       <m:sSub>
                         <m:sSubPr>
                           <m:ctrlPr>
-                            <a:rPr lang="fr-BE" altLang="fr-FR" sz="2800" i="1" smtClean="0"/>
+                            <a:rPr lang="fr-BE" altLang="fr-FR" sz="2800" i="1" smtClean="0">
+                              <a:latin typeface="Cambria Math" panose="02040503050406030204" pitchFamily="18" charset="0"/>
+                            </a:rPr>
                           </m:ctrlPr>
                         </m:sSubPr>
                         <m:e>
                           <m:r>
                             <a:rPr lang="fr-BE" altLang="fr-FR" sz="2800" i="1" smtClean="0">
+                              <a:latin typeface="Cambria Math" panose="02040503050406030204" pitchFamily="18" charset="0"/>
                               <a:ea typeface="Cambria Math" panose="02040503050406030204" pitchFamily="18" charset="0"/>
                             </a:rPr>
                             <m:t>𝜋</m:t>
@@ -8440,7 +8468,9 @@
                         </m:e>
                         <m:sub>
                           <m:r>
-                            <a:rPr lang="fr-BE" altLang="fr-FR" sz="2800" b="0" i="1" smtClean="0"/>
+                            <a:rPr lang="fr-BE" altLang="fr-FR" sz="2800" b="0" i="1" smtClean="0">
+                              <a:latin typeface="Cambria Math" panose="02040503050406030204" pitchFamily="18" charset="0"/>
+                            </a:rPr>
                             <m:t>𝑈𝐼𝐷</m:t>
                           </m:r>
                         </m:sub>
@@ -8448,29 +8478,38 @@
                       <m:d>
                         <m:dPr>
                           <m:ctrlPr>
-                            <a:rPr lang="fr-BE" altLang="fr-FR" sz="2800" b="0" i="1" smtClean="0"/>
+                            <a:rPr lang="fr-BE" altLang="fr-FR" sz="2800" b="0" i="1" smtClean="0">
+                              <a:latin typeface="Cambria Math" panose="02040503050406030204" pitchFamily="18" charset="0"/>
+                            </a:rPr>
                           </m:ctrlPr>
                         </m:dPr>
                         <m:e>
                           <m:r>
-                            <a:rPr lang="fr-BE" altLang="fr-FR" sz="2800" b="0" i="1" smtClean="0"/>
+                            <a:rPr lang="fr-BE" altLang="fr-FR" sz="2800" b="0" i="1" smtClean="0">
+                              <a:latin typeface="Cambria Math" panose="02040503050406030204" pitchFamily="18" charset="0"/>
+                            </a:rPr>
                             <m:t>𝑅𝑒𝑐h𝑎𝑟𝑔𝑒𝑢𝑟</m:t>
                           </m:r>
                         </m:e>
                       </m:d>
                       <m:r>
-                        <a:rPr lang="fr-BE" altLang="fr-FR" sz="2800" b="0" i="1" smtClean="0"/>
+                        <a:rPr lang="fr-BE" altLang="fr-FR" sz="2800" b="0" i="1" smtClean="0">
+                          <a:latin typeface="Cambria Math" panose="02040503050406030204" pitchFamily="18" charset="0"/>
+                        </a:rPr>
                         <m:t>− </m:t>
                       </m:r>
                       <m:sSub>
                         <m:sSubPr>
                           <m:ctrlPr>
-                            <a:rPr lang="fr-BE" altLang="fr-FR" sz="2800" b="0" i="1" smtClean="0"/>
+                            <a:rPr lang="fr-BE" altLang="fr-FR" sz="2800" b="0" i="1" smtClean="0">
+                              <a:latin typeface="Cambria Math" panose="02040503050406030204" pitchFamily="18" charset="0"/>
+                            </a:rPr>
                           </m:ctrlPr>
                         </m:sSubPr>
                         <m:e>
                           <m:r>
                             <a:rPr lang="fr-BE" altLang="fr-FR" sz="2800" b="0" i="1" smtClean="0">
+                              <a:latin typeface="Cambria Math" panose="02040503050406030204" pitchFamily="18" charset="0"/>
                               <a:ea typeface="Cambria Math" panose="02040503050406030204" pitchFamily="18" charset="0"/>
                             </a:rPr>
                             <m:t>𝜋</m:t>
@@ -8478,29 +8517,41 @@
                         </m:e>
                         <m:sub>
                           <m:r>
-                            <a:rPr lang="fr-BE" altLang="fr-FR" sz="2800" b="0" i="1" smtClean="0"/>
+                            <a:rPr lang="fr-BE" altLang="fr-FR" sz="2800" b="0" i="1" smtClean="0">
+                              <a:latin typeface="Cambria Math" panose="02040503050406030204" pitchFamily="18" charset="0"/>
+                            </a:rPr>
                             <m:t>𝑈𝐼𝐷</m:t>
                           </m:r>
                         </m:sub>
                       </m:sSub>
                       <m:r>
-                        <a:rPr lang="fr-BE" altLang="fr-FR" sz="2800" b="0" i="1" smtClean="0"/>
+                        <a:rPr lang="fr-BE" altLang="fr-FR" sz="2800" b="0" i="1" smtClean="0">
+                          <a:latin typeface="Cambria Math" panose="02040503050406030204" pitchFamily="18" charset="0"/>
+                        </a:rPr>
                         <m:t>(</m:t>
                       </m:r>
                       <m:r>
-                        <a:rPr lang="fr-BE" altLang="fr-FR" sz="2800" b="0" i="1" smtClean="0"/>
+                        <a:rPr lang="fr-BE" altLang="fr-FR" sz="2800" b="0" i="1" smtClean="0">
+                          <a:latin typeface="Cambria Math" panose="02040503050406030204" pitchFamily="18" charset="0"/>
+                        </a:rPr>
                         <m:t>𝑅</m:t>
                       </m:r>
                       <m:r>
-                        <a:rPr lang="fr-BE" altLang="fr-FR" sz="2800" b="0" i="1" smtClean="0"/>
+                        <a:rPr lang="fr-BE" altLang="fr-FR" sz="2800" b="0" i="1" smtClean="0">
+                          <a:latin typeface="Cambria Math" panose="02040503050406030204" pitchFamily="18" charset="0"/>
+                        </a:rPr>
                         <m:t> −</m:t>
                       </m:r>
                       <m:r>
-                        <a:rPr lang="fr-BE" altLang="fr-FR" sz="2800" b="0" i="1" smtClean="0"/>
+                        <a:rPr lang="fr-BE" altLang="fr-FR" sz="2800" b="0" i="1" smtClean="0">
+                          <a:latin typeface="Cambria Math" panose="02040503050406030204" pitchFamily="18" charset="0"/>
+                        </a:rPr>
                         <m:t>𝑇𝑅</m:t>
                       </m:r>
                       <m:r>
-                        <a:rPr lang="fr-BE" altLang="fr-FR" sz="2800" b="0" i="1" smtClean="0"/>
+                        <a:rPr lang="fr-BE" altLang="fr-FR" sz="2800" b="0" i="1" smtClean="0">
+                          <a:latin typeface="Cambria Math" panose="02040503050406030204" pitchFamily="18" charset="0"/>
+                        </a:rPr>
                         <m:t>)</m:t>
                       </m:r>
                     </m:oMath>
@@ -8623,7 +8674,7 @@
             </p:txBody>
           </p:sp>
         </mc:Choice>
-        <mc:Fallback>
+        <mc:Fallback xmlns="">
           <p:sp>
             <p:nvSpPr>
               <p:cNvPr id="10243" name="Espace réservé du contenu 2">

</xml_diff>

<commit_message>
Update slides(maybe) for the last time
</commit_message>
<xml_diff>
--- a/slides.pptx
+++ b/slides.pptx
@@ -8222,7 +8222,21 @@
                   <a:rPr lang="fr-BE" altLang="fr-FR" sz="2800" dirty="0">
                     <a:ea typeface="Cambria Math" panose="02040503050406030204" pitchFamily="18" charset="0"/>
                   </a:rPr>
-                  <a:t>⟵ Trajet,  R ⟵ Recharge</a:t>
+                  <a:t>⟵ Trajet,  R ⟵ Recharge, RU </a:t>
+                </a:r>
+                <a:r>
+                  <a:rPr lang="fr-BE" altLang="fr-FR" sz="2800" dirty="0">
+                    <a:latin typeface="Cambria Math" panose="02040503050406030204" pitchFamily="18" charset="0"/>
+                    <a:ea typeface="Cambria Math" panose="02040503050406030204" pitchFamily="18" charset="0"/>
+                  </a:rPr>
+                  <a:t>⟵ </a:t>
+                </a:r>
+                <a:r>
+                  <a:rPr lang="fr-BE" altLang="fr-FR" sz="2800" dirty="0" err="1">
+                    <a:latin typeface="Cambria Math" panose="02040503050406030204" pitchFamily="18" charset="0"/>
+                    <a:ea typeface="Cambria Math" panose="02040503050406030204" pitchFamily="18" charset="0"/>
+                  </a:rPr>
+                  <a:t>Rechargeur</a:t>
                 </a:r>
                 <a:endParaRPr lang="fr-BE" altLang="fr-FR" sz="2800" dirty="0"/>
               </a:p>
@@ -8243,7 +8257,6 @@
                       <m:sSubPr>
                         <m:ctrlPr>
                           <a:rPr lang="fr-BE" altLang="fr-FR" sz="2800" i="1" smtClean="0">
-                            <a:latin typeface="Cambria Math" panose="02040503050406030204" pitchFamily="18" charset="0"/>
                             <a:ea typeface="Cambria Math" panose="02040503050406030204" pitchFamily="18" charset="0"/>
                           </a:rPr>
                         </m:ctrlPr>
@@ -8251,7 +8264,6 @@
                       <m:e>
                         <m:r>
                           <a:rPr lang="fr-BE" altLang="fr-FR" sz="2800" i="1" smtClean="0">
-                            <a:latin typeface="Cambria Math" panose="02040503050406030204" pitchFamily="18" charset="0"/>
                             <a:ea typeface="Cambria Math" panose="02040503050406030204" pitchFamily="18" charset="0"/>
                           </a:rPr>
                           <m:t>𝜋</m:t>
@@ -8260,14 +8272,12 @@
                       <m:sub>
                         <m:r>
                           <a:rPr lang="fr-BE" altLang="fr-FR" sz="2800" b="0" i="1" smtClean="0">
-                            <a:latin typeface="Cambria Math" panose="02040503050406030204" pitchFamily="18" charset="0"/>
                             <a:ea typeface="Cambria Math" panose="02040503050406030204" pitchFamily="18" charset="0"/>
                           </a:rPr>
                           <m:t>𝑅</m:t>
                         </m:r>
                         <m:r>
                           <a:rPr lang="fr-BE" altLang="fr-FR" sz="2800" b="0" i="1" smtClean="0">
-                            <a:latin typeface="Cambria Math" panose="02040503050406030204" pitchFamily="18" charset="0"/>
                             <a:ea typeface="Cambria Math" panose="02040503050406030204" pitchFamily="18" charset="0"/>
                           </a:rPr>
                           <m:t>.∗</m:t>
@@ -8278,7 +8288,6 @@
                       <m:dPr>
                         <m:ctrlPr>
                           <a:rPr lang="fr-BE" altLang="fr-FR" sz="2800" b="0" i="1" smtClean="0">
-                            <a:latin typeface="Cambria Math" panose="02040503050406030204" pitchFamily="18" charset="0"/>
                             <a:ea typeface="Cambria Math" panose="02040503050406030204" pitchFamily="18" charset="0"/>
                           </a:rPr>
                         </m:ctrlPr>
@@ -8286,14 +8295,12 @@
                       <m:e>
                         <m:r>
                           <a:rPr lang="fr-BE" altLang="fr-FR" sz="2800" b="0" i="1" smtClean="0">
-                            <a:latin typeface="Cambria Math" panose="02040503050406030204" pitchFamily="18" charset="0"/>
                             <a:ea typeface="Cambria Math" panose="02040503050406030204" pitchFamily="18" charset="0"/>
                           </a:rPr>
                           <m:t>𝑇</m:t>
                         </m:r>
                         <m:r>
                           <a:rPr lang="fr-BE" altLang="fr-FR" sz="2800" b="0" i="1" smtClean="0">
-                            <a:latin typeface="Cambria Math" panose="02040503050406030204" pitchFamily="18" charset="0"/>
                             <a:ea typeface="Cambria Math" panose="02040503050406030204" pitchFamily="18" charset="0"/>
                           </a:rPr>
                           <m:t> </m:t>
@@ -8302,7 +8309,6 @@
                           <m:sSubPr>
                             <m:ctrlPr>
                               <a:rPr lang="fr-BE" altLang="fr-FR" sz="2800" b="0" i="1" smtClean="0">
-                                <a:latin typeface="Cambria Math" panose="02040503050406030204" pitchFamily="18" charset="0"/>
                                 <a:ea typeface="Cambria Math" panose="02040503050406030204" pitchFamily="18" charset="0"/>
                               </a:rPr>
                             </m:ctrlPr>
@@ -8310,7 +8316,6 @@
                           <m:e>
                             <m:r>
                               <a:rPr lang="fr-BE" altLang="fr-FR" sz="2800" b="0" i="1" smtClean="0">
-                                <a:latin typeface="Cambria Math" panose="02040503050406030204" pitchFamily="18" charset="0"/>
                                 <a:ea typeface="Cambria Math" panose="02040503050406030204" pitchFamily="18" charset="0"/>
                               </a:rPr>
                               <m:t>⋈</m:t>
@@ -8319,105 +8324,90 @@
                           <m:sub>
                             <m:r>
                               <a:rPr lang="fr-BE" altLang="fr-FR" sz="2800" b="0" i="1" smtClean="0">
-                                <a:latin typeface="Cambria Math" panose="02040503050406030204" pitchFamily="18" charset="0"/>
                                 <a:ea typeface="Cambria Math" panose="02040503050406030204" pitchFamily="18" charset="0"/>
                               </a:rPr>
                               <m:t>𝑇</m:t>
                             </m:r>
                             <m:r>
                               <a:rPr lang="fr-BE" altLang="fr-FR" sz="2800" b="0" i="1" smtClean="0">
-                                <a:latin typeface="Cambria Math" panose="02040503050406030204" pitchFamily="18" charset="0"/>
                                 <a:ea typeface="Cambria Math" panose="02040503050406030204" pitchFamily="18" charset="0"/>
                               </a:rPr>
                               <m:t>.</m:t>
                             </m:r>
                             <m:r>
                               <a:rPr lang="fr-BE" altLang="fr-FR" sz="2800" b="0" i="1" smtClean="0">
-                                <a:latin typeface="Cambria Math" panose="02040503050406030204" pitchFamily="18" charset="0"/>
                                 <a:ea typeface="Cambria Math" panose="02040503050406030204" pitchFamily="18" charset="0"/>
                               </a:rPr>
                               <m:t>𝑈𝐼𝐷</m:t>
                             </m:r>
                             <m:r>
                               <a:rPr lang="fr-BE" altLang="fr-FR" sz="2800" b="0" i="1" smtClean="0">
-                                <a:latin typeface="Cambria Math" panose="02040503050406030204" pitchFamily="18" charset="0"/>
                                 <a:ea typeface="Cambria Math" panose="02040503050406030204" pitchFamily="18" charset="0"/>
                               </a:rPr>
                               <m:t>=</m:t>
                             </m:r>
                             <m:r>
                               <a:rPr lang="fr-BE" altLang="fr-FR" sz="2800" b="0" i="1" smtClean="0">
-                                <a:latin typeface="Cambria Math" panose="02040503050406030204" pitchFamily="18" charset="0"/>
                                 <a:ea typeface="Cambria Math" panose="02040503050406030204" pitchFamily="18" charset="0"/>
                               </a:rPr>
                               <m:t>𝑅</m:t>
                             </m:r>
                             <m:r>
                               <a:rPr lang="fr-BE" altLang="fr-FR" sz="2800" b="0" i="1" smtClean="0">
-                                <a:latin typeface="Cambria Math" panose="02040503050406030204" pitchFamily="18" charset="0"/>
                                 <a:ea typeface="Cambria Math" panose="02040503050406030204" pitchFamily="18" charset="0"/>
                               </a:rPr>
                               <m:t>.</m:t>
                             </m:r>
                             <m:r>
                               <a:rPr lang="fr-BE" altLang="fr-FR" sz="2800" b="0" i="1" smtClean="0">
-                                <a:latin typeface="Cambria Math" panose="02040503050406030204" pitchFamily="18" charset="0"/>
                                 <a:ea typeface="Cambria Math" panose="02040503050406030204" pitchFamily="18" charset="0"/>
                               </a:rPr>
                               <m:t>𝑈𝐼𝐷</m:t>
                             </m:r>
                             <m:r>
                               <a:rPr lang="fr-BE" altLang="fr-FR" sz="2800" b="0" i="1" smtClean="0">
-                                <a:latin typeface="Cambria Math" panose="02040503050406030204" pitchFamily="18" charset="0"/>
                                 <a:ea typeface="Cambria Math" panose="02040503050406030204" pitchFamily="18" charset="0"/>
                               </a:rPr>
                               <m:t>,</m:t>
                             </m:r>
                             <m:r>
                               <a:rPr lang="fr-BE" altLang="fr-FR" sz="2800" b="0" i="1" smtClean="0">
-                                <a:latin typeface="Cambria Math" panose="02040503050406030204" pitchFamily="18" charset="0"/>
                                 <a:ea typeface="Cambria Math" panose="02040503050406030204" pitchFamily="18" charset="0"/>
                               </a:rPr>
                               <m:t>𝑇</m:t>
                             </m:r>
                             <m:r>
                               <a:rPr lang="fr-BE" altLang="fr-FR" sz="2800" b="0" i="1" smtClean="0">
-                                <a:latin typeface="Cambria Math" panose="02040503050406030204" pitchFamily="18" charset="0"/>
                                 <a:ea typeface="Cambria Math" panose="02040503050406030204" pitchFamily="18" charset="0"/>
                               </a:rPr>
                               <m:t>.</m:t>
                             </m:r>
                             <m:r>
                               <a:rPr lang="fr-BE" altLang="fr-FR" sz="2800" b="0" i="1" smtClean="0">
-                                <a:latin typeface="Cambria Math" panose="02040503050406030204" pitchFamily="18" charset="0"/>
                                 <a:ea typeface="Cambria Math" panose="02040503050406030204" pitchFamily="18" charset="0"/>
                               </a:rPr>
                               <m:t>𝑇𝐼𝐷</m:t>
                             </m:r>
                             <m:r>
                               <a:rPr lang="fr-BE" altLang="fr-FR" sz="2800" b="0" i="1" smtClean="0">
-                                <a:latin typeface="Cambria Math" panose="02040503050406030204" pitchFamily="18" charset="0"/>
                                 <a:ea typeface="Cambria Math" panose="02040503050406030204" pitchFamily="18" charset="0"/>
                               </a:rPr>
                               <m:t>=</m:t>
                             </m:r>
                             <m:r>
                               <a:rPr lang="fr-BE" altLang="fr-FR" sz="2800" b="0" i="1" smtClean="0">
-                                <a:latin typeface="Cambria Math" panose="02040503050406030204" pitchFamily="18" charset="0"/>
                                 <a:ea typeface="Cambria Math" panose="02040503050406030204" pitchFamily="18" charset="0"/>
                               </a:rPr>
                               <m:t>𝑅</m:t>
                             </m:r>
                             <m:r>
                               <a:rPr lang="fr-BE" altLang="fr-FR" sz="2800" b="0" i="1" smtClean="0">
-                                <a:latin typeface="Cambria Math" panose="02040503050406030204" pitchFamily="18" charset="0"/>
                                 <a:ea typeface="Cambria Math" panose="02040503050406030204" pitchFamily="18" charset="0"/>
                               </a:rPr>
                               <m:t>.</m:t>
                             </m:r>
                             <m:r>
                               <a:rPr lang="fr-BE" altLang="fr-FR" sz="2800" b="0" i="1" smtClean="0">
-                                <a:latin typeface="Cambria Math" panose="02040503050406030204" pitchFamily="18" charset="0"/>
                                 <a:ea typeface="Cambria Math" panose="02040503050406030204" pitchFamily="18" charset="0"/>
                               </a:rPr>
                               <m:t>𝑇𝐼𝐷</m:t>
@@ -8426,7 +8416,6 @@
                         </m:sSub>
                         <m:r>
                           <a:rPr lang="fr-BE" altLang="fr-FR" sz="2800" b="0" i="1" smtClean="0">
-                            <a:latin typeface="Cambria Math" panose="02040503050406030204" pitchFamily="18" charset="0"/>
                             <a:ea typeface="Cambria Math" panose="02040503050406030204" pitchFamily="18" charset="0"/>
                           </a:rPr>
                           <m:t>𝑅</m:t>
@@ -8452,15 +8441,12 @@
                       <m:sSub>
                         <m:sSubPr>
                           <m:ctrlPr>
-                            <a:rPr lang="fr-BE" altLang="fr-FR" sz="2800" i="1" smtClean="0">
-                              <a:latin typeface="Cambria Math" panose="02040503050406030204" pitchFamily="18" charset="0"/>
-                            </a:rPr>
+                            <a:rPr lang="fr-BE" altLang="fr-FR" sz="2800" i="1" smtClean="0"/>
                           </m:ctrlPr>
                         </m:sSubPr>
                         <m:e>
                           <m:r>
                             <a:rPr lang="fr-BE" altLang="fr-FR" sz="2800" i="1" smtClean="0">
-                              <a:latin typeface="Cambria Math" panose="02040503050406030204" pitchFamily="18" charset="0"/>
                               <a:ea typeface="Cambria Math" panose="02040503050406030204" pitchFamily="18" charset="0"/>
                             </a:rPr>
                             <m:t>𝜋</m:t>
@@ -8468,9 +8454,7 @@
                         </m:e>
                         <m:sub>
                           <m:r>
-                            <a:rPr lang="fr-BE" altLang="fr-FR" sz="2800" b="0" i="1" smtClean="0">
-                              <a:latin typeface="Cambria Math" panose="02040503050406030204" pitchFamily="18" charset="0"/>
-                            </a:rPr>
+                            <a:rPr lang="fr-BE" altLang="fr-FR" sz="2800" b="0" i="1" smtClean="0"/>
                             <m:t>𝑈𝐼𝐷</m:t>
                           </m:r>
                         </m:sub>
@@ -8478,38 +8462,35 @@
                       <m:d>
                         <m:dPr>
                           <m:ctrlPr>
-                            <a:rPr lang="fr-BE" altLang="fr-FR" sz="2800" b="0" i="1" smtClean="0">
-                              <a:latin typeface="Cambria Math" panose="02040503050406030204" pitchFamily="18" charset="0"/>
-                            </a:rPr>
+                            <a:rPr lang="fr-BE" altLang="fr-FR" sz="2800" b="0" i="1" smtClean="0"/>
                           </m:ctrlPr>
                         </m:dPr>
                         <m:e>
                           <m:r>
+                            <a:rPr lang="fr-BE" altLang="fr-FR" sz="2800" b="0" i="1" smtClean="0"/>
+                            <m:t>𝑅</m:t>
+                          </m:r>
+                          <m:r>
                             <a:rPr lang="fr-BE" altLang="fr-FR" sz="2800" b="0" i="1" smtClean="0">
                               <a:latin typeface="Cambria Math" panose="02040503050406030204" pitchFamily="18" charset="0"/>
                             </a:rPr>
-                            <m:t>𝑅𝑒𝑐h𝑎𝑟𝑔𝑒𝑢𝑟</m:t>
+                            <m:t>𝑈</m:t>
                           </m:r>
                         </m:e>
                       </m:d>
                       <m:r>
-                        <a:rPr lang="fr-BE" altLang="fr-FR" sz="2800" b="0" i="1" smtClean="0">
-                          <a:latin typeface="Cambria Math" panose="02040503050406030204" pitchFamily="18" charset="0"/>
-                        </a:rPr>
+                        <a:rPr lang="fr-BE" altLang="fr-FR" sz="2800" b="0" i="1" smtClean="0"/>
                         <m:t>− </m:t>
                       </m:r>
                       <m:sSub>
                         <m:sSubPr>
                           <m:ctrlPr>
-                            <a:rPr lang="fr-BE" altLang="fr-FR" sz="2800" b="0" i="1" smtClean="0">
-                              <a:latin typeface="Cambria Math" panose="02040503050406030204" pitchFamily="18" charset="0"/>
-                            </a:rPr>
+                            <a:rPr lang="fr-BE" altLang="fr-FR" sz="2800" b="0" i="1" smtClean="0"/>
                           </m:ctrlPr>
                         </m:sSubPr>
                         <m:e>
                           <m:r>
                             <a:rPr lang="fr-BE" altLang="fr-FR" sz="2800" b="0" i="1" smtClean="0">
-                              <a:latin typeface="Cambria Math" panose="02040503050406030204" pitchFamily="18" charset="0"/>
                               <a:ea typeface="Cambria Math" panose="02040503050406030204" pitchFamily="18" charset="0"/>
                             </a:rPr>
                             <m:t>𝜋</m:t>
@@ -8517,41 +8498,29 @@
                         </m:e>
                         <m:sub>
                           <m:r>
-                            <a:rPr lang="fr-BE" altLang="fr-FR" sz="2800" b="0" i="1" smtClean="0">
-                              <a:latin typeface="Cambria Math" panose="02040503050406030204" pitchFamily="18" charset="0"/>
-                            </a:rPr>
+                            <a:rPr lang="fr-BE" altLang="fr-FR" sz="2800" b="0" i="1" smtClean="0"/>
                             <m:t>𝑈𝐼𝐷</m:t>
                           </m:r>
                         </m:sub>
                       </m:sSub>
                       <m:r>
-                        <a:rPr lang="fr-BE" altLang="fr-FR" sz="2800" b="0" i="1" smtClean="0">
-                          <a:latin typeface="Cambria Math" panose="02040503050406030204" pitchFamily="18" charset="0"/>
-                        </a:rPr>
+                        <a:rPr lang="fr-BE" altLang="fr-FR" sz="2800" b="0" i="1" smtClean="0"/>
                         <m:t>(</m:t>
                       </m:r>
                       <m:r>
-                        <a:rPr lang="fr-BE" altLang="fr-FR" sz="2800" b="0" i="1" smtClean="0">
-                          <a:latin typeface="Cambria Math" panose="02040503050406030204" pitchFamily="18" charset="0"/>
-                        </a:rPr>
+                        <a:rPr lang="fr-BE" altLang="fr-FR" sz="2800" b="0" i="1" smtClean="0"/>
                         <m:t>𝑅</m:t>
                       </m:r>
                       <m:r>
-                        <a:rPr lang="fr-BE" altLang="fr-FR" sz="2800" b="0" i="1" smtClean="0">
-                          <a:latin typeface="Cambria Math" panose="02040503050406030204" pitchFamily="18" charset="0"/>
-                        </a:rPr>
+                        <a:rPr lang="fr-BE" altLang="fr-FR" sz="2800" b="0" i="1" smtClean="0"/>
                         <m:t> −</m:t>
                       </m:r>
                       <m:r>
-                        <a:rPr lang="fr-BE" altLang="fr-FR" sz="2800" b="0" i="1" smtClean="0">
-                          <a:latin typeface="Cambria Math" panose="02040503050406030204" pitchFamily="18" charset="0"/>
-                        </a:rPr>
+                        <a:rPr lang="fr-BE" altLang="fr-FR" sz="2800" b="0" i="1" smtClean="0"/>
                         <m:t>𝑇𝑅</m:t>
                       </m:r>
                       <m:r>
-                        <a:rPr lang="fr-BE" altLang="fr-FR" sz="2800" b="0" i="1" smtClean="0">
-                          <a:latin typeface="Cambria Math" panose="02040503050406030204" pitchFamily="18" charset="0"/>
-                        </a:rPr>
+                        <a:rPr lang="fr-BE" altLang="fr-FR" sz="2800" b="0" i="1" smtClean="0"/>
                         <m:t>)</m:t>
                       </m:r>
                     </m:oMath>
@@ -8566,25 +8535,41 @@
                 </a:r>
                 <a:r>
                   <a:rPr lang="fr-BE" altLang="fr-FR" sz="2800" dirty="0" err="1"/>
-                  <a:t>r.UID</a:t>
+                  <a:t>ru.UID</a:t>
                 </a:r>
                 <a:r>
                   <a:rPr lang="fr-BE" altLang="fr-FR" sz="2800" dirty="0"/>
-                  <a:t> | </a:t>
-                </a:r>
-                <a:r>
-                  <a:rPr lang="fr-BE" altLang="fr-FR" sz="2800" dirty="0" err="1"/>
-                  <a:t>Rechargeur</a:t>
-                </a:r>
-                <a:r>
-                  <a:rPr lang="fr-BE" altLang="fr-FR" sz="2800" dirty="0"/>
-                  <a:t>(r) </a:t>
+                  <a:t> | RU(ru) </a:t>
                 </a:r>
                 <a:r>
                   <a:rPr lang="fr-BE" altLang="fr-FR" sz="2800" dirty="0">
                     <a:ea typeface="Cambria Math" panose="02040503050406030204" pitchFamily="18" charset="0"/>
                   </a:rPr>
-                  <a:t>∧ ¬ ∃ r(T(t) ∧ </a:t>
+                  <a:t>∧ ∀r (R(r) ∧ </a:t>
+                </a:r>
+                <a:r>
+                  <a:rPr lang="fr-BE" altLang="fr-FR" sz="2800" dirty="0" err="1">
+                    <a:ea typeface="Cambria Math" panose="02040503050406030204" pitchFamily="18" charset="0"/>
+                  </a:rPr>
+                  <a:t>r.UID</a:t>
+                </a:r>
+                <a:r>
+                  <a:rPr lang="fr-BE" altLang="fr-FR" sz="2800" dirty="0">
+                    <a:ea typeface="Cambria Math" panose="02040503050406030204" pitchFamily="18" charset="0"/>
+                  </a:rPr>
+                  <a:t>=</a:t>
+                </a:r>
+                <a:r>
+                  <a:rPr lang="fr-BE" altLang="fr-FR" sz="2800" dirty="0" err="1">
+                    <a:ea typeface="Cambria Math" panose="02040503050406030204" pitchFamily="18" charset="0"/>
+                  </a:rPr>
+                  <a:t>ru.UID</a:t>
+                </a:r>
+                <a:r>
+                  <a:rPr lang="fr-BE" altLang="fr-FR" sz="2800" dirty="0">
+                    <a:ea typeface="Cambria Math" panose="02040503050406030204" pitchFamily="18" charset="0"/>
+                  </a:rPr>
+                  <a:t> → ∃t (T(t) ∧ </a:t>
                 </a:r>
                 <a:r>
                   <a:rPr lang="fr-BE" altLang="fr-FR" sz="2800" dirty="0" err="1">
@@ -8642,15 +8627,7 @@
               <a:p>
                 <a:r>
                   <a:rPr lang="fr-BE" altLang="fr-FR" sz="2400" dirty="0"/>
-                  <a:t>SELECT UID FROM </a:t>
-                </a:r>
-                <a:r>
-                  <a:rPr lang="fr-BE" altLang="fr-FR" sz="2400" dirty="0" err="1"/>
-                  <a:t>Rechargeur</a:t>
-                </a:r>
-                <a:r>
-                  <a:rPr lang="fr-BE" altLang="fr-FR" sz="2400" dirty="0"/>
-                  <a:t> WHERE UID NOT IN</a:t>
+                  <a:t>SELECT UID FROM RU WHERE UID NOT IN</a:t>
                 </a:r>
               </a:p>
               <a:p>
@@ -8668,15 +8645,7 @@
                 </a:pPr>
                 <a:r>
                   <a:rPr lang="fr-BE" altLang="fr-FR" sz="2400" dirty="0"/>
-                  <a:t>(SELECT T.UID FROM T WHERE T.UID=R.UID AND T.TID=</a:t>
-                </a:r>
-                <a:r>
-                  <a:rPr lang="fr-BE" altLang="fr-FR" sz="2400"/>
-                  <a:t>R.TID</a:t>
-                </a:r>
-                <a:r>
-                  <a:rPr lang="fr-BE" altLang="fr-FR" sz="2400" dirty="0"/>
-                  <a:t>))</a:t>
+                  <a:t>(SELECT T.UID FROM T WHERE T.UID=R.UID AND T.TID=R.TID))</a:t>
                 </a:r>
               </a:p>
             </p:txBody>
@@ -8707,7 +8676,7 @@
               <a:blipFill>
                 <a:blip r:embed="rId2"/>
                 <a:stretch>
-                  <a:fillRect l="-1432" t="-1080" r="-955" b="-2881"/>
+                  <a:fillRect l="-1432" t="-1080" b="-2881"/>
                 </a:stretch>
               </a:blipFill>
             </p:spPr>

</xml_diff>